<commit_message>
saving changes in rough PPT
</commit_message>
<xml_diff>
--- a/tikzVortrag.pptx
+++ b/tikzVortrag.pptx
@@ -7,6 +7,10 @@
   <p:sldIdLst>
     <p:sldId id="257" r:id="rId2"/>
     <p:sldId id="258" r:id="rId3"/>
+    <p:sldId id="259" r:id="rId4"/>
+    <p:sldId id="260" r:id="rId5"/>
+    <p:sldId id="261" r:id="rId6"/>
+    <p:sldId id="262" r:id="rId7"/>
   </p:sldIdLst>
   <p:sldSz cx="12192000" cy="6858000"/>
   <p:notesSz cx="6858000" cy="9144000"/>
@@ -105,6 +109,11 @@
       </a:defRPr>
     </a:lvl9pPr>
   </p:defaultTextStyle>
+  <p:extLst>
+    <p:ext uri="{EFAFB233-063F-42B5-8137-9DF3F51BA10A}">
+      <p15:sldGuideLst xmlns:p15="http://schemas.microsoft.com/office/powerpoint/2012/main"/>
+    </p:ext>
+  </p:extLst>
 </p:presentation>
 </file>
 
@@ -3809,6 +3818,342 @@
 </p:sld>
 </file>
 
+<file path=ppt/slides/slide3.xml><?xml version="1.0" encoding="utf-8"?>
+<p:sld xmlns:a="http://schemas.openxmlformats.org/drawingml/2006/main" xmlns:r="http://schemas.openxmlformats.org/officeDocument/2006/relationships" xmlns:p="http://schemas.openxmlformats.org/presentationml/2006/main">
+  <p:cSld>
+    <p:spTree>
+      <p:nvGrpSpPr>
+        <p:cNvPr id="1" name=""/>
+        <p:cNvGrpSpPr/>
+        <p:nvPr/>
+      </p:nvGrpSpPr>
+      <p:grpSpPr>
+        <a:xfrm>
+          <a:off x="0" y="0"/>
+          <a:ext cx="0" cy="0"/>
+          <a:chOff x="0" y="0"/>
+          <a:chExt cx="0" cy="0"/>
+        </a:xfrm>
+      </p:grpSpPr>
+      <p:pic>
+        <p:nvPicPr>
+          <p:cNvPr id="5" name="Picture 4">
+            <a:extLst>
+              <a:ext uri="{FF2B5EF4-FFF2-40B4-BE49-F238E27FC236}">
+                <a16:creationId xmlns:a16="http://schemas.microsoft.com/office/drawing/2014/main" id="{36CB6E3A-B59E-B349-4AE8-D5446D54866C}"/>
+              </a:ext>
+            </a:extLst>
+          </p:cNvPr>
+          <p:cNvPicPr>
+            <a:picLocks noChangeAspect="1"/>
+          </p:cNvPicPr>
+          <p:nvPr/>
+        </p:nvPicPr>
+        <p:blipFill>
+          <a:blip r:embed="rId2"/>
+          <a:stretch>
+            <a:fillRect/>
+          </a:stretch>
+        </p:blipFill>
+        <p:spPr>
+          <a:xfrm>
+            <a:off x="809212" y="1801657"/>
+            <a:ext cx="5551004" cy="2097244"/>
+          </a:xfrm>
+          <a:prstGeom prst="rect">
+            <a:avLst/>
+          </a:prstGeom>
+        </p:spPr>
+      </p:pic>
+      <p:pic>
+        <p:nvPicPr>
+          <p:cNvPr id="7" name="Picture 6">
+            <a:extLst>
+              <a:ext uri="{FF2B5EF4-FFF2-40B4-BE49-F238E27FC236}">
+                <a16:creationId xmlns:a16="http://schemas.microsoft.com/office/drawing/2014/main" id="{FC115C2B-3221-2B32-5A15-49FC7D456C80}"/>
+              </a:ext>
+            </a:extLst>
+          </p:cNvPr>
+          <p:cNvPicPr>
+            <a:picLocks noChangeAspect="1"/>
+          </p:cNvPicPr>
+          <p:nvPr/>
+        </p:nvPicPr>
+        <p:blipFill>
+          <a:blip r:embed="rId3"/>
+          <a:stretch>
+            <a:fillRect/>
+          </a:stretch>
+        </p:blipFill>
+        <p:spPr>
+          <a:xfrm>
+            <a:off x="7669434" y="1327150"/>
+            <a:ext cx="3610479" cy="3286584"/>
+          </a:xfrm>
+          <a:prstGeom prst="rect">
+            <a:avLst/>
+          </a:prstGeom>
+        </p:spPr>
+      </p:pic>
+    </p:spTree>
+    <p:extLst>
+      <p:ext uri="{BB962C8B-B14F-4D97-AF65-F5344CB8AC3E}">
+        <p14:creationId xmlns:p14="http://schemas.microsoft.com/office/powerpoint/2010/main" val="1367314956"/>
+      </p:ext>
+    </p:extLst>
+  </p:cSld>
+  <p:clrMapOvr>
+    <a:masterClrMapping/>
+  </p:clrMapOvr>
+</p:sld>
+</file>
+
+<file path=ppt/slides/slide4.xml><?xml version="1.0" encoding="utf-8"?>
+<p:sld xmlns:a="http://schemas.openxmlformats.org/drawingml/2006/main" xmlns:r="http://schemas.openxmlformats.org/officeDocument/2006/relationships" xmlns:p="http://schemas.openxmlformats.org/presentationml/2006/main">
+  <p:cSld>
+    <p:spTree>
+      <p:nvGrpSpPr>
+        <p:cNvPr id="1" name="">
+          <a:extLst>
+            <a:ext uri="{FF2B5EF4-FFF2-40B4-BE49-F238E27FC236}">
+              <a16:creationId xmlns:a16="http://schemas.microsoft.com/office/drawing/2014/main" id="{53C2E062-CFE9-0EF3-3DF0-5030E8C8FB66}"/>
+            </a:ext>
+          </a:extLst>
+        </p:cNvPr>
+        <p:cNvGrpSpPr/>
+        <p:nvPr/>
+      </p:nvGrpSpPr>
+      <p:grpSpPr>
+        <a:xfrm>
+          <a:off x="0" y="0"/>
+          <a:ext cx="0" cy="0"/>
+          <a:chOff x="0" y="0"/>
+          <a:chExt cx="0" cy="0"/>
+        </a:xfrm>
+      </p:grpSpPr>
+      <p:pic>
+        <p:nvPicPr>
+          <p:cNvPr id="7" name="Picture 6">
+            <a:extLst>
+              <a:ext uri="{FF2B5EF4-FFF2-40B4-BE49-F238E27FC236}">
+                <a16:creationId xmlns:a16="http://schemas.microsoft.com/office/drawing/2014/main" id="{4527800D-3752-5C99-96C8-9A69B2DD765E}"/>
+              </a:ext>
+            </a:extLst>
+          </p:cNvPr>
+          <p:cNvPicPr>
+            <a:picLocks noChangeAspect="1"/>
+          </p:cNvPicPr>
+          <p:nvPr/>
+        </p:nvPicPr>
+        <p:blipFill>
+          <a:blip r:embed="rId2"/>
+          <a:stretch>
+            <a:fillRect/>
+          </a:stretch>
+        </p:blipFill>
+        <p:spPr>
+          <a:xfrm>
+            <a:off x="7332884" y="1130300"/>
+            <a:ext cx="3610479" cy="3286584"/>
+          </a:xfrm>
+          <a:prstGeom prst="rect">
+            <a:avLst/>
+          </a:prstGeom>
+        </p:spPr>
+      </p:pic>
+      <p:pic>
+        <p:nvPicPr>
+          <p:cNvPr id="3" name="Picture 2">
+            <a:extLst>
+              <a:ext uri="{FF2B5EF4-FFF2-40B4-BE49-F238E27FC236}">
+                <a16:creationId xmlns:a16="http://schemas.microsoft.com/office/drawing/2014/main" id="{0429F25C-C522-4A8A-E670-A19118524FB5}"/>
+              </a:ext>
+            </a:extLst>
+          </p:cNvPr>
+          <p:cNvPicPr>
+            <a:picLocks noChangeAspect="1"/>
+          </p:cNvPicPr>
+          <p:nvPr/>
+        </p:nvPicPr>
+        <p:blipFill>
+          <a:blip r:embed="rId3"/>
+          <a:stretch>
+            <a:fillRect/>
+          </a:stretch>
+        </p:blipFill>
+        <p:spPr>
+          <a:xfrm>
+            <a:off x="551915" y="3641551"/>
+            <a:ext cx="5449060" cy="885949"/>
+          </a:xfrm>
+          <a:prstGeom prst="rect">
+            <a:avLst/>
+          </a:prstGeom>
+        </p:spPr>
+      </p:pic>
+      <p:pic>
+        <p:nvPicPr>
+          <p:cNvPr id="6" name="Picture 5">
+            <a:extLst>
+              <a:ext uri="{FF2B5EF4-FFF2-40B4-BE49-F238E27FC236}">
+                <a16:creationId xmlns:a16="http://schemas.microsoft.com/office/drawing/2014/main" id="{51E11E4F-C623-EEB4-BDDF-E7370DAF8735}"/>
+              </a:ext>
+            </a:extLst>
+          </p:cNvPr>
+          <p:cNvPicPr>
+            <a:picLocks noChangeAspect="1"/>
+          </p:cNvPicPr>
+          <p:nvPr/>
+        </p:nvPicPr>
+        <p:blipFill>
+          <a:blip r:embed="rId4"/>
+          <a:stretch>
+            <a:fillRect/>
+          </a:stretch>
+        </p:blipFill>
+        <p:spPr>
+          <a:xfrm>
+            <a:off x="1039584" y="1258775"/>
+            <a:ext cx="3267531" cy="1609950"/>
+          </a:xfrm>
+          <a:prstGeom prst="rect">
+            <a:avLst/>
+          </a:prstGeom>
+        </p:spPr>
+      </p:pic>
+    </p:spTree>
+    <p:extLst>
+      <p:ext uri="{BB962C8B-B14F-4D97-AF65-F5344CB8AC3E}">
+        <p14:creationId xmlns:p14="http://schemas.microsoft.com/office/powerpoint/2010/main" val="645303638"/>
+      </p:ext>
+    </p:extLst>
+  </p:cSld>
+  <p:clrMapOvr>
+    <a:masterClrMapping/>
+  </p:clrMapOvr>
+</p:sld>
+</file>
+
+<file path=ppt/slides/slide5.xml><?xml version="1.0" encoding="utf-8"?>
+<p:sld xmlns:a="http://schemas.openxmlformats.org/drawingml/2006/main" xmlns:r="http://schemas.openxmlformats.org/officeDocument/2006/relationships" xmlns:p="http://schemas.openxmlformats.org/presentationml/2006/main">
+  <p:cSld>
+    <p:spTree>
+      <p:nvGrpSpPr>
+        <p:cNvPr id="1" name=""/>
+        <p:cNvGrpSpPr/>
+        <p:nvPr/>
+      </p:nvGrpSpPr>
+      <p:grpSpPr>
+        <a:xfrm>
+          <a:off x="0" y="0"/>
+          <a:ext cx="0" cy="0"/>
+          <a:chOff x="0" y="0"/>
+          <a:chExt cx="0" cy="0"/>
+        </a:xfrm>
+      </p:grpSpPr>
+      <p:pic>
+        <p:nvPicPr>
+          <p:cNvPr id="3" name="Picture 2">
+            <a:extLst>
+              <a:ext uri="{FF2B5EF4-FFF2-40B4-BE49-F238E27FC236}">
+                <a16:creationId xmlns:a16="http://schemas.microsoft.com/office/drawing/2014/main" id="{4B72BAAF-A691-7F4B-8FDE-8533DFFE53E7}"/>
+              </a:ext>
+            </a:extLst>
+          </p:cNvPr>
+          <p:cNvPicPr>
+            <a:picLocks noChangeAspect="1"/>
+          </p:cNvPicPr>
+          <p:nvPr/>
+        </p:nvPicPr>
+        <p:blipFill>
+          <a:blip r:embed="rId2"/>
+          <a:stretch>
+            <a:fillRect/>
+          </a:stretch>
+        </p:blipFill>
+        <p:spPr>
+          <a:xfrm>
+            <a:off x="1852001" y="1717450"/>
+            <a:ext cx="8754697" cy="3219899"/>
+          </a:xfrm>
+          <a:prstGeom prst="rect">
+            <a:avLst/>
+          </a:prstGeom>
+        </p:spPr>
+      </p:pic>
+    </p:spTree>
+    <p:extLst>
+      <p:ext uri="{BB962C8B-B14F-4D97-AF65-F5344CB8AC3E}">
+        <p14:creationId xmlns:p14="http://schemas.microsoft.com/office/powerpoint/2010/main" val="1615071783"/>
+      </p:ext>
+    </p:extLst>
+  </p:cSld>
+  <p:clrMapOvr>
+    <a:masterClrMapping/>
+  </p:clrMapOvr>
+</p:sld>
+</file>
+
+<file path=ppt/slides/slide6.xml><?xml version="1.0" encoding="utf-8"?>
+<p:sld xmlns:a="http://schemas.openxmlformats.org/drawingml/2006/main" xmlns:r="http://schemas.openxmlformats.org/officeDocument/2006/relationships" xmlns:p="http://schemas.openxmlformats.org/presentationml/2006/main">
+  <p:cSld>
+    <p:spTree>
+      <p:nvGrpSpPr>
+        <p:cNvPr id="1" name=""/>
+        <p:cNvGrpSpPr/>
+        <p:nvPr/>
+      </p:nvGrpSpPr>
+      <p:grpSpPr>
+        <a:xfrm>
+          <a:off x="0" y="0"/>
+          <a:ext cx="0" cy="0"/>
+          <a:chOff x="0" y="0"/>
+          <a:chExt cx="0" cy="0"/>
+        </a:xfrm>
+      </p:grpSpPr>
+      <p:pic>
+        <p:nvPicPr>
+          <p:cNvPr id="3" name="Picture 2">
+            <a:extLst>
+              <a:ext uri="{FF2B5EF4-FFF2-40B4-BE49-F238E27FC236}">
+                <a16:creationId xmlns:a16="http://schemas.microsoft.com/office/drawing/2014/main" id="{A1F7C578-3A93-3038-271F-65BD3D7020BB}"/>
+              </a:ext>
+            </a:extLst>
+          </p:cNvPr>
+          <p:cNvPicPr>
+            <a:picLocks noChangeAspect="1"/>
+          </p:cNvPicPr>
+          <p:nvPr/>
+        </p:nvPicPr>
+        <p:blipFill>
+          <a:blip r:embed="rId2"/>
+          <a:stretch>
+            <a:fillRect/>
+          </a:stretch>
+        </p:blipFill>
+        <p:spPr>
+          <a:xfrm>
+            <a:off x="1775809" y="318653"/>
+            <a:ext cx="8640381" cy="6220693"/>
+          </a:xfrm>
+          <a:prstGeom prst="rect">
+            <a:avLst/>
+          </a:prstGeom>
+        </p:spPr>
+      </p:pic>
+    </p:spTree>
+    <p:extLst>
+      <p:ext uri="{BB962C8B-B14F-4D97-AF65-F5344CB8AC3E}">
+        <p14:creationId xmlns:p14="http://schemas.microsoft.com/office/powerpoint/2010/main" val="3290446067"/>
+      </p:ext>
+    </p:extLst>
+  </p:cSld>
+  <p:clrMapOvr>
+    <a:masterClrMapping/>
+  </p:clrMapOvr>
+</p:sld>
+</file>
+
 <file path=ppt/theme/theme1.xml><?xml version="1.0" encoding="utf-8"?>
 <a:theme xmlns:a="http://schemas.openxmlformats.org/drawingml/2006/main" name="Office Theme">
   <a:themeElements>

</xml_diff>

<commit_message>
documented the referenceFrames example into the PPT and added code comments
</commit_message>
<xml_diff>
--- a/tikzVortrag.pptx
+++ b/tikzVortrag.pptx
@@ -12,6 +12,9 @@
     <p:sldId id="261" r:id="rId6"/>
     <p:sldId id="263" r:id="rId7"/>
     <p:sldId id="262" r:id="rId8"/>
+    <p:sldId id="264" r:id="rId9"/>
+    <p:sldId id="265" r:id="rId10"/>
+    <p:sldId id="266" r:id="rId11"/>
   </p:sldIdLst>
   <p:sldSz cx="12192000" cy="6858000"/>
   <p:notesSz cx="6858000" cy="9144000"/>
@@ -265,7 +268,7 @@
           <a:p>
             <a:fld id="{2A05E3ED-811A-443E-80DC-BCE310A8BC67}" type="datetimeFigureOut">
               <a:rPr lang="en-US" smtClean="0"/>
-              <a:t>4/20/2025</a:t>
+              <a:t>4/21/2025</a:t>
             </a:fld>
             <a:endParaRPr lang="en-US"/>
           </a:p>
@@ -319,7 +322,7 @@
           <a:p>
             <a:fld id="{351BFC78-12F1-4E22-9BB9-E32895C8D786}" type="slidenum">
               <a:rPr lang="en-US" smtClean="0"/>
-              <a:t>‹#›</a:t>
+              <a:t>‹Nr.›</a:t>
             </a:fld>
             <a:endParaRPr lang="en-US"/>
           </a:p>
@@ -463,7 +466,7 @@
           <a:p>
             <a:fld id="{2A05E3ED-811A-443E-80DC-BCE310A8BC67}" type="datetimeFigureOut">
               <a:rPr lang="en-US" smtClean="0"/>
-              <a:t>4/20/2025</a:t>
+              <a:t>4/21/2025</a:t>
             </a:fld>
             <a:endParaRPr lang="en-US"/>
           </a:p>
@@ -517,7 +520,7 @@
           <a:p>
             <a:fld id="{351BFC78-12F1-4E22-9BB9-E32895C8D786}" type="slidenum">
               <a:rPr lang="en-US" smtClean="0"/>
-              <a:t>‹#›</a:t>
+              <a:t>‹Nr.›</a:t>
             </a:fld>
             <a:endParaRPr lang="en-US"/>
           </a:p>
@@ -671,7 +674,7 @@
           <a:p>
             <a:fld id="{2A05E3ED-811A-443E-80DC-BCE310A8BC67}" type="datetimeFigureOut">
               <a:rPr lang="en-US" smtClean="0"/>
-              <a:t>4/20/2025</a:t>
+              <a:t>4/21/2025</a:t>
             </a:fld>
             <a:endParaRPr lang="en-US"/>
           </a:p>
@@ -725,7 +728,7 @@
           <a:p>
             <a:fld id="{351BFC78-12F1-4E22-9BB9-E32895C8D786}" type="slidenum">
               <a:rPr lang="en-US" smtClean="0"/>
-              <a:t>‹#›</a:t>
+              <a:t>‹Nr.›</a:t>
             </a:fld>
             <a:endParaRPr lang="en-US"/>
           </a:p>
@@ -869,7 +872,7 @@
           <a:p>
             <a:fld id="{2A05E3ED-811A-443E-80DC-BCE310A8BC67}" type="datetimeFigureOut">
               <a:rPr lang="en-US" smtClean="0"/>
-              <a:t>4/20/2025</a:t>
+              <a:t>4/21/2025</a:t>
             </a:fld>
             <a:endParaRPr lang="en-US"/>
           </a:p>
@@ -923,7 +926,7 @@
           <a:p>
             <a:fld id="{351BFC78-12F1-4E22-9BB9-E32895C8D786}" type="slidenum">
               <a:rPr lang="en-US" smtClean="0"/>
-              <a:t>‹#›</a:t>
+              <a:t>‹Nr.›</a:t>
             </a:fld>
             <a:endParaRPr lang="en-US"/>
           </a:p>
@@ -1144,7 +1147,7 @@
           <a:p>
             <a:fld id="{2A05E3ED-811A-443E-80DC-BCE310A8BC67}" type="datetimeFigureOut">
               <a:rPr lang="en-US" smtClean="0"/>
-              <a:t>4/20/2025</a:t>
+              <a:t>4/21/2025</a:t>
             </a:fld>
             <a:endParaRPr lang="en-US"/>
           </a:p>
@@ -1198,7 +1201,7 @@
           <a:p>
             <a:fld id="{351BFC78-12F1-4E22-9BB9-E32895C8D786}" type="slidenum">
               <a:rPr lang="en-US" smtClean="0"/>
-              <a:t>‹#›</a:t>
+              <a:t>‹Nr.›</a:t>
             </a:fld>
             <a:endParaRPr lang="en-US"/>
           </a:p>
@@ -1409,7 +1412,7 @@
           <a:p>
             <a:fld id="{2A05E3ED-811A-443E-80DC-BCE310A8BC67}" type="datetimeFigureOut">
               <a:rPr lang="en-US" smtClean="0"/>
-              <a:t>4/20/2025</a:t>
+              <a:t>4/21/2025</a:t>
             </a:fld>
             <a:endParaRPr lang="en-US"/>
           </a:p>
@@ -1463,7 +1466,7 @@
           <a:p>
             <a:fld id="{351BFC78-12F1-4E22-9BB9-E32895C8D786}" type="slidenum">
               <a:rPr lang="en-US" smtClean="0"/>
-              <a:t>‹#›</a:t>
+              <a:t>‹Nr.›</a:t>
             </a:fld>
             <a:endParaRPr lang="en-US"/>
           </a:p>
@@ -1821,7 +1824,7 @@
           <a:p>
             <a:fld id="{2A05E3ED-811A-443E-80DC-BCE310A8BC67}" type="datetimeFigureOut">
               <a:rPr lang="en-US" smtClean="0"/>
-              <a:t>4/20/2025</a:t>
+              <a:t>4/21/2025</a:t>
             </a:fld>
             <a:endParaRPr lang="en-US"/>
           </a:p>
@@ -1875,7 +1878,7 @@
           <a:p>
             <a:fld id="{351BFC78-12F1-4E22-9BB9-E32895C8D786}" type="slidenum">
               <a:rPr lang="en-US" smtClean="0"/>
-              <a:t>‹#›</a:t>
+              <a:t>‹Nr.›</a:t>
             </a:fld>
             <a:endParaRPr lang="en-US"/>
           </a:p>
@@ -1962,7 +1965,7 @@
           <a:p>
             <a:fld id="{2A05E3ED-811A-443E-80DC-BCE310A8BC67}" type="datetimeFigureOut">
               <a:rPr lang="en-US" smtClean="0"/>
-              <a:t>4/20/2025</a:t>
+              <a:t>4/21/2025</a:t>
             </a:fld>
             <a:endParaRPr lang="en-US"/>
           </a:p>
@@ -2016,7 +2019,7 @@
           <a:p>
             <a:fld id="{351BFC78-12F1-4E22-9BB9-E32895C8D786}" type="slidenum">
               <a:rPr lang="en-US" smtClean="0"/>
-              <a:t>‹#›</a:t>
+              <a:t>‹Nr.›</a:t>
             </a:fld>
             <a:endParaRPr lang="en-US"/>
           </a:p>
@@ -2075,7 +2078,7 @@
           <a:p>
             <a:fld id="{2A05E3ED-811A-443E-80DC-BCE310A8BC67}" type="datetimeFigureOut">
               <a:rPr lang="en-US" smtClean="0"/>
-              <a:t>4/20/2025</a:t>
+              <a:t>4/21/2025</a:t>
             </a:fld>
             <a:endParaRPr lang="en-US"/>
           </a:p>
@@ -2129,7 +2132,7 @@
           <a:p>
             <a:fld id="{351BFC78-12F1-4E22-9BB9-E32895C8D786}" type="slidenum">
               <a:rPr lang="en-US" smtClean="0"/>
-              <a:t>‹#›</a:t>
+              <a:t>‹Nr.›</a:t>
             </a:fld>
             <a:endParaRPr lang="en-US"/>
           </a:p>
@@ -2386,7 +2389,7 @@
           <a:p>
             <a:fld id="{2A05E3ED-811A-443E-80DC-BCE310A8BC67}" type="datetimeFigureOut">
               <a:rPr lang="en-US" smtClean="0"/>
-              <a:t>4/20/2025</a:t>
+              <a:t>4/21/2025</a:t>
             </a:fld>
             <a:endParaRPr lang="en-US"/>
           </a:p>
@@ -2440,7 +2443,7 @@
           <a:p>
             <a:fld id="{351BFC78-12F1-4E22-9BB9-E32895C8D786}" type="slidenum">
               <a:rPr lang="en-US" smtClean="0"/>
-              <a:t>‹#›</a:t>
+              <a:t>‹Nr.›</a:t>
             </a:fld>
             <a:endParaRPr lang="en-US"/>
           </a:p>
@@ -2674,7 +2677,7 @@
           <a:p>
             <a:fld id="{2A05E3ED-811A-443E-80DC-BCE310A8BC67}" type="datetimeFigureOut">
               <a:rPr lang="en-US" smtClean="0"/>
-              <a:t>4/20/2025</a:t>
+              <a:t>4/21/2025</a:t>
             </a:fld>
             <a:endParaRPr lang="en-US"/>
           </a:p>
@@ -2728,7 +2731,7 @@
           <a:p>
             <a:fld id="{351BFC78-12F1-4E22-9BB9-E32895C8D786}" type="slidenum">
               <a:rPr lang="en-US" smtClean="0"/>
-              <a:t>‹#›</a:t>
+              <a:t>‹Nr.›</a:t>
             </a:fld>
             <a:endParaRPr lang="en-US"/>
           </a:p>
@@ -2915,7 +2918,7 @@
           <a:p>
             <a:fld id="{2A05E3ED-811A-443E-80DC-BCE310A8BC67}" type="datetimeFigureOut">
               <a:rPr lang="en-US" smtClean="0"/>
-              <a:t>4/20/2025</a:t>
+              <a:t>4/21/2025</a:t>
             </a:fld>
             <a:endParaRPr lang="en-US"/>
           </a:p>
@@ -3005,7 +3008,7 @@
           <a:p>
             <a:fld id="{351BFC78-12F1-4E22-9BB9-E32895C8D786}" type="slidenum">
               <a:rPr lang="en-US" smtClean="0"/>
-              <a:t>‹#›</a:t>
+              <a:t>‹Nr.›</a:t>
             </a:fld>
             <a:endParaRPr lang="en-US"/>
           </a:p>
@@ -3565,6 +3568,151 @@
 </p:sld>
 </file>
 
+<file path=ppt/slides/slide10.xml><?xml version="1.0" encoding="utf-8"?>
+<p:sld xmlns:a="http://schemas.openxmlformats.org/drawingml/2006/main" xmlns:r="http://schemas.openxmlformats.org/officeDocument/2006/relationships" xmlns:p="http://schemas.openxmlformats.org/presentationml/2006/main">
+  <p:cSld>
+    <p:spTree>
+      <p:nvGrpSpPr>
+        <p:cNvPr id="1" name=""/>
+        <p:cNvGrpSpPr/>
+        <p:nvPr/>
+      </p:nvGrpSpPr>
+      <p:grpSpPr>
+        <a:xfrm>
+          <a:off x="0" y="0"/>
+          <a:ext cx="0" cy="0"/>
+          <a:chOff x="0" y="0"/>
+          <a:chExt cx="0" cy="0"/>
+        </a:xfrm>
+      </p:grpSpPr>
+      <p:pic>
+        <p:nvPicPr>
+          <p:cNvPr id="8" name="Grafik 7">
+            <a:extLst>
+              <a:ext uri="{FF2B5EF4-FFF2-40B4-BE49-F238E27FC236}">
+                <a16:creationId xmlns:a16="http://schemas.microsoft.com/office/drawing/2014/main" id="{7BA866E4-0DF6-41F8-8882-2F371C3EC56C}"/>
+              </a:ext>
+            </a:extLst>
+          </p:cNvPr>
+          <p:cNvPicPr>
+            <a:picLocks noChangeAspect="1"/>
+          </p:cNvPicPr>
+          <p:nvPr/>
+        </p:nvPicPr>
+        <p:blipFill>
+          <a:blip r:embed="rId2">
+            <a:extLst>
+              <a:ext uri="{28A0092B-C50C-407E-A947-70E740481C1C}">
+                <a14:useLocalDpi xmlns:a14="http://schemas.microsoft.com/office/drawing/2010/main" val="0"/>
+              </a:ext>
+              <a:ext uri="{96DAC541-7B7A-43D3-8B79-37D633B846F1}">
+                <asvg:svgBlip xmlns:asvg="http://schemas.microsoft.com/office/drawing/2016/SVG/main" r:embed="rId3"/>
+              </a:ext>
+            </a:extLst>
+          </a:blip>
+          <a:stretch>
+            <a:fillRect/>
+          </a:stretch>
+        </p:blipFill>
+        <p:spPr>
+          <a:xfrm>
+            <a:off x="2079894" y="579514"/>
+            <a:ext cx="8032211" cy="5698972"/>
+          </a:xfrm>
+          <a:prstGeom prst="rect">
+            <a:avLst/>
+          </a:prstGeom>
+        </p:spPr>
+      </p:pic>
+      <p:sp>
+        <p:nvSpPr>
+          <p:cNvPr id="9" name="Textfeld 8">
+            <a:extLst>
+              <a:ext uri="{FF2B5EF4-FFF2-40B4-BE49-F238E27FC236}">
+                <a16:creationId xmlns:a16="http://schemas.microsoft.com/office/drawing/2014/main" id="{3402DC6E-5618-4214-808E-E89243114E33}"/>
+              </a:ext>
+            </a:extLst>
+          </p:cNvPr>
+          <p:cNvSpPr txBox="1"/>
+          <p:nvPr/>
+        </p:nvSpPr>
+        <p:spPr>
+          <a:xfrm>
+            <a:off x="8857129" y="376518"/>
+            <a:ext cx="3083859" cy="600164"/>
+          </a:xfrm>
+          <a:prstGeom prst="rect">
+            <a:avLst/>
+          </a:prstGeom>
+          <a:noFill/>
+        </p:spPr>
+        <p:txBody>
+          <a:bodyPr wrap="square" rtlCol="0">
+            <a:spAutoFit/>
+          </a:bodyPr>
+          <a:lstStyle/>
+          <a:p>
+            <a:r>
+              <a:rPr lang="de-DE" sz="1100" dirty="0" err="1">
+                <a:latin typeface="Verdana" panose="020B0604030504040204" pitchFamily="34" charset="0"/>
+                <a:ea typeface="Verdana" panose="020B0604030504040204" pitchFamily="34" charset="0"/>
+              </a:rPr>
+              <a:t>referenceFrames_standalone.tex</a:t>
+            </a:r>
+            <a:endParaRPr lang="de-DE" sz="1100" dirty="0">
+              <a:latin typeface="Verdana" panose="020B0604030504040204" pitchFamily="34" charset="0"/>
+              <a:ea typeface="Verdana" panose="020B0604030504040204" pitchFamily="34" charset="0"/>
+            </a:endParaRPr>
+          </a:p>
+          <a:p>
+            <a:pPr marL="171450" indent="-171450">
+              <a:buFont typeface="Arial" panose="020B0604020202020204" pitchFamily="34" charset="0"/>
+              <a:buChar char="•"/>
+            </a:pPr>
+            <a:r>
+              <a:rPr lang="de-DE" sz="1100" dirty="0" err="1">
+                <a:latin typeface="Verdana" panose="020B0604030504040204" pitchFamily="34" charset="0"/>
+                <a:ea typeface="Verdana" panose="020B0604030504040204" pitchFamily="34" charset="0"/>
+              </a:rPr>
+              <a:t>referenceFrames.tex</a:t>
+            </a:r>
+            <a:endParaRPr lang="de-DE" sz="1100" dirty="0">
+              <a:latin typeface="Verdana" panose="020B0604030504040204" pitchFamily="34" charset="0"/>
+              <a:ea typeface="Verdana" panose="020B0604030504040204" pitchFamily="34" charset="0"/>
+            </a:endParaRPr>
+          </a:p>
+          <a:p>
+            <a:pPr marL="628650" lvl="1" indent="-171450">
+              <a:buFont typeface="Arial" panose="020B0604020202020204" pitchFamily="34" charset="0"/>
+              <a:buChar char="•"/>
+            </a:pPr>
+            <a:r>
+              <a:rPr lang="de-DE" sz="1100" dirty="0" err="1">
+                <a:latin typeface="Verdana" panose="020B0604030504040204" pitchFamily="34" charset="0"/>
+                <a:ea typeface="Verdana" panose="020B0604030504040204" pitchFamily="34" charset="0"/>
+              </a:rPr>
+              <a:t>quadCopter.tex</a:t>
+            </a:r>
+            <a:endParaRPr lang="de-DE" sz="1100" dirty="0">
+              <a:latin typeface="Verdana" panose="020B0604030504040204" pitchFamily="34" charset="0"/>
+              <a:ea typeface="Verdana" panose="020B0604030504040204" pitchFamily="34" charset="0"/>
+            </a:endParaRPr>
+          </a:p>
+        </p:txBody>
+      </p:sp>
+    </p:spTree>
+    <p:extLst>
+      <p:ext uri="{BB962C8B-B14F-4D97-AF65-F5344CB8AC3E}">
+        <p14:creationId xmlns:p14="http://schemas.microsoft.com/office/powerpoint/2010/main" val="666905583"/>
+      </p:ext>
+    </p:extLst>
+  </p:cSld>
+  <p:clrMapOvr>
+    <a:masterClrMapping/>
+  </p:clrMapOvr>
+</p:sld>
+</file>
+
 <file path=ppt/slides/slide2.xml><?xml version="1.0" encoding="utf-8"?>
 <p:sld xmlns:a="http://schemas.openxmlformats.org/drawingml/2006/main" xmlns:r="http://schemas.openxmlformats.org/officeDocument/2006/relationships" xmlns:p="http://schemas.openxmlformats.org/presentationml/2006/main">
   <p:cSld>
@@ -4242,6 +4390,630 @@
     <p:extLst>
       <p:ext uri="{BB962C8B-B14F-4D97-AF65-F5344CB8AC3E}">
         <p14:creationId xmlns:p14="http://schemas.microsoft.com/office/powerpoint/2010/main" val="3290446067"/>
+      </p:ext>
+    </p:extLst>
+  </p:cSld>
+  <p:clrMapOvr>
+    <a:masterClrMapping/>
+  </p:clrMapOvr>
+</p:sld>
+</file>
+
+<file path=ppt/slides/slide8.xml><?xml version="1.0" encoding="utf-8"?>
+<p:sld xmlns:a="http://schemas.openxmlformats.org/drawingml/2006/main" xmlns:r="http://schemas.openxmlformats.org/officeDocument/2006/relationships" xmlns:p="http://schemas.openxmlformats.org/presentationml/2006/main">
+  <p:cSld>
+    <p:spTree>
+      <p:nvGrpSpPr>
+        <p:cNvPr id="1" name=""/>
+        <p:cNvGrpSpPr/>
+        <p:nvPr/>
+      </p:nvGrpSpPr>
+      <p:grpSpPr>
+        <a:xfrm>
+          <a:off x="0" y="0"/>
+          <a:ext cx="0" cy="0"/>
+          <a:chOff x="0" y="0"/>
+          <a:chExt cx="0" cy="0"/>
+        </a:xfrm>
+      </p:grpSpPr>
+      <p:pic>
+        <p:nvPicPr>
+          <p:cNvPr id="8" name="Grafik 7">
+            <a:extLst>
+              <a:ext uri="{FF2B5EF4-FFF2-40B4-BE49-F238E27FC236}">
+                <a16:creationId xmlns:a16="http://schemas.microsoft.com/office/drawing/2014/main" id="{7BA866E4-0DF6-41F8-8882-2F371C3EC56C}"/>
+              </a:ext>
+            </a:extLst>
+          </p:cNvPr>
+          <p:cNvPicPr>
+            <a:picLocks noChangeAspect="1"/>
+          </p:cNvPicPr>
+          <p:nvPr/>
+        </p:nvPicPr>
+        <p:blipFill>
+          <a:blip r:embed="rId2">
+            <a:extLst>
+              <a:ext uri="{28A0092B-C50C-407E-A947-70E740481C1C}">
+                <a14:useLocalDpi xmlns:a14="http://schemas.microsoft.com/office/drawing/2010/main" val="0"/>
+              </a:ext>
+              <a:ext uri="{96DAC541-7B7A-43D3-8B79-37D633B846F1}">
+                <asvg:svgBlip xmlns:asvg="http://schemas.microsoft.com/office/drawing/2016/SVG/main" r:embed="rId3"/>
+              </a:ext>
+            </a:extLst>
+          </a:blip>
+          <a:stretch>
+            <a:fillRect/>
+          </a:stretch>
+        </p:blipFill>
+        <p:spPr>
+          <a:xfrm>
+            <a:off x="2079894" y="579514"/>
+            <a:ext cx="8032211" cy="5698972"/>
+          </a:xfrm>
+          <a:prstGeom prst="rect">
+            <a:avLst/>
+          </a:prstGeom>
+        </p:spPr>
+      </p:pic>
+      <p:sp>
+        <p:nvSpPr>
+          <p:cNvPr id="9" name="Textfeld 8">
+            <a:extLst>
+              <a:ext uri="{FF2B5EF4-FFF2-40B4-BE49-F238E27FC236}">
+                <a16:creationId xmlns:a16="http://schemas.microsoft.com/office/drawing/2014/main" id="{3402DC6E-5618-4214-808E-E89243114E33}"/>
+              </a:ext>
+            </a:extLst>
+          </p:cNvPr>
+          <p:cNvSpPr txBox="1"/>
+          <p:nvPr/>
+        </p:nvSpPr>
+        <p:spPr>
+          <a:xfrm>
+            <a:off x="8857129" y="376518"/>
+            <a:ext cx="3083859" cy="600164"/>
+          </a:xfrm>
+          <a:prstGeom prst="rect">
+            <a:avLst/>
+          </a:prstGeom>
+          <a:noFill/>
+        </p:spPr>
+        <p:txBody>
+          <a:bodyPr wrap="square" rtlCol="0">
+            <a:spAutoFit/>
+          </a:bodyPr>
+          <a:lstStyle/>
+          <a:p>
+            <a:pPr marL="285750" indent="-285750">
+              <a:buFont typeface="Arial" panose="020B0604020202020204" pitchFamily="34" charset="0"/>
+              <a:buChar char="•"/>
+            </a:pPr>
+            <a:r>
+              <a:rPr lang="de-DE" sz="1100" dirty="0">
+                <a:latin typeface="Verdana" panose="020B0604030504040204" pitchFamily="34" charset="0"/>
+                <a:ea typeface="Verdana" panose="020B0604030504040204" pitchFamily="34" charset="0"/>
+              </a:rPr>
+              <a:t>\</a:t>
+            </a:r>
+            <a:r>
+              <a:rPr lang="de-DE" sz="1100" dirty="0" err="1">
+                <a:latin typeface="Verdana" panose="020B0604030504040204" pitchFamily="34" charset="0"/>
+                <a:ea typeface="Verdana" panose="020B0604030504040204" pitchFamily="34" charset="0"/>
+              </a:rPr>
+              <a:t>usepackage</a:t>
+            </a:r>
+            <a:r>
+              <a:rPr lang="de-DE" sz="1100" dirty="0">
+                <a:latin typeface="Verdana" panose="020B0604030504040204" pitchFamily="34" charset="0"/>
+                <a:ea typeface="Verdana" panose="020B0604030504040204" pitchFamily="34" charset="0"/>
+              </a:rPr>
+              <a:t>{</a:t>
+            </a:r>
+            <a:r>
+              <a:rPr lang="de-DE" sz="1100" dirty="0" err="1">
+                <a:latin typeface="Verdana" panose="020B0604030504040204" pitchFamily="34" charset="0"/>
+                <a:ea typeface="Verdana" panose="020B0604030504040204" pitchFamily="34" charset="0"/>
+              </a:rPr>
+              <a:t>tikz</a:t>
+            </a:r>
+            <a:r>
+              <a:rPr lang="de-DE" sz="1100" dirty="0">
+                <a:latin typeface="Verdana" panose="020B0604030504040204" pitchFamily="34" charset="0"/>
+                <a:ea typeface="Verdana" panose="020B0604030504040204" pitchFamily="34" charset="0"/>
+              </a:rPr>
+              <a:t>}</a:t>
+            </a:r>
+          </a:p>
+          <a:p>
+            <a:pPr marL="285750" indent="-285750">
+              <a:buFont typeface="Arial" panose="020B0604020202020204" pitchFamily="34" charset="0"/>
+              <a:buChar char="•"/>
+            </a:pPr>
+            <a:r>
+              <a:rPr lang="de-DE" sz="1100" dirty="0">
+                <a:latin typeface="Verdana" panose="020B0604030504040204" pitchFamily="34" charset="0"/>
+                <a:ea typeface="Verdana" panose="020B0604030504040204" pitchFamily="34" charset="0"/>
+              </a:rPr>
+              <a:t>\</a:t>
+            </a:r>
+            <a:r>
+              <a:rPr lang="de-DE" sz="1100" dirty="0" err="1">
+                <a:latin typeface="Verdana" panose="020B0604030504040204" pitchFamily="34" charset="0"/>
+                <a:ea typeface="Verdana" panose="020B0604030504040204" pitchFamily="34" charset="0"/>
+              </a:rPr>
+              <a:t>usepackage</a:t>
+            </a:r>
+            <a:r>
+              <a:rPr lang="de-DE" sz="1100" dirty="0">
+                <a:latin typeface="Verdana" panose="020B0604030504040204" pitchFamily="34" charset="0"/>
+                <a:ea typeface="Verdana" panose="020B0604030504040204" pitchFamily="34" charset="0"/>
+              </a:rPr>
+              <a:t>{tikz-3dplot}</a:t>
+            </a:r>
+          </a:p>
+          <a:p>
+            <a:pPr marL="285750" indent="-285750">
+              <a:buFont typeface="Arial" panose="020B0604020202020204" pitchFamily="34" charset="0"/>
+              <a:buChar char="•"/>
+            </a:pPr>
+            <a:r>
+              <a:rPr lang="de-DE" sz="1100" dirty="0">
+                <a:latin typeface="Verdana" panose="020B0604030504040204" pitchFamily="34" charset="0"/>
+                <a:ea typeface="Verdana" panose="020B0604030504040204" pitchFamily="34" charset="0"/>
+              </a:rPr>
+              <a:t>\</a:t>
+            </a:r>
+            <a:r>
+              <a:rPr lang="de-DE" sz="1100" dirty="0" err="1">
+                <a:latin typeface="Verdana" panose="020B0604030504040204" pitchFamily="34" charset="0"/>
+                <a:ea typeface="Verdana" panose="020B0604030504040204" pitchFamily="34" charset="0"/>
+              </a:rPr>
+              <a:t>usepackage</a:t>
+            </a:r>
+            <a:r>
+              <a:rPr lang="de-DE" sz="1100" dirty="0">
+                <a:latin typeface="Verdana" panose="020B0604030504040204" pitchFamily="34" charset="0"/>
+                <a:ea typeface="Verdana" panose="020B0604030504040204" pitchFamily="34" charset="0"/>
+              </a:rPr>
+              <a:t>{</a:t>
+            </a:r>
+            <a:r>
+              <a:rPr lang="de-DE" sz="1100" dirty="0" err="1">
+                <a:latin typeface="Verdana" panose="020B0604030504040204" pitchFamily="34" charset="0"/>
+                <a:ea typeface="Verdana" panose="020B0604030504040204" pitchFamily="34" charset="0"/>
+              </a:rPr>
+              <a:t>arrows</a:t>
+            </a:r>
+            <a:r>
+              <a:rPr lang="de-DE" sz="1100" dirty="0">
+                <a:latin typeface="Verdana" panose="020B0604030504040204" pitchFamily="34" charset="0"/>
+                <a:ea typeface="Verdana" panose="020B0604030504040204" pitchFamily="34" charset="0"/>
+              </a:rPr>
+              <a:t>}</a:t>
+            </a:r>
+          </a:p>
+        </p:txBody>
+      </p:sp>
+    </p:spTree>
+    <p:extLst>
+      <p:ext uri="{BB962C8B-B14F-4D97-AF65-F5344CB8AC3E}">
+        <p14:creationId xmlns:p14="http://schemas.microsoft.com/office/powerpoint/2010/main" val="145233993"/>
+      </p:ext>
+    </p:extLst>
+  </p:cSld>
+  <p:clrMapOvr>
+    <a:masterClrMapping/>
+  </p:clrMapOvr>
+</p:sld>
+</file>
+
+<file path=ppt/slides/slide9.xml><?xml version="1.0" encoding="utf-8"?>
+<p:sld xmlns:a="http://schemas.openxmlformats.org/drawingml/2006/main" xmlns:r="http://schemas.openxmlformats.org/officeDocument/2006/relationships" xmlns:p="http://schemas.openxmlformats.org/presentationml/2006/main">
+  <p:cSld>
+    <p:spTree>
+      <p:nvGrpSpPr>
+        <p:cNvPr id="1" name=""/>
+        <p:cNvGrpSpPr/>
+        <p:nvPr/>
+      </p:nvGrpSpPr>
+      <p:grpSpPr>
+        <a:xfrm>
+          <a:off x="0" y="0"/>
+          <a:ext cx="0" cy="0"/>
+          <a:chOff x="0" y="0"/>
+          <a:chExt cx="0" cy="0"/>
+        </a:xfrm>
+      </p:grpSpPr>
+      <p:pic>
+        <p:nvPicPr>
+          <p:cNvPr id="8" name="Grafik 7">
+            <a:extLst>
+              <a:ext uri="{FF2B5EF4-FFF2-40B4-BE49-F238E27FC236}">
+                <a16:creationId xmlns:a16="http://schemas.microsoft.com/office/drawing/2014/main" id="{7BA866E4-0DF6-41F8-8882-2F371C3EC56C}"/>
+              </a:ext>
+            </a:extLst>
+          </p:cNvPr>
+          <p:cNvPicPr>
+            <a:picLocks noChangeAspect="1"/>
+          </p:cNvPicPr>
+          <p:nvPr/>
+        </p:nvPicPr>
+        <p:blipFill>
+          <a:blip r:embed="rId2">
+            <a:extLst>
+              <a:ext uri="{28A0092B-C50C-407E-A947-70E740481C1C}">
+                <a14:useLocalDpi xmlns:a14="http://schemas.microsoft.com/office/drawing/2010/main" val="0"/>
+              </a:ext>
+              <a:ext uri="{96DAC541-7B7A-43D3-8B79-37D633B846F1}">
+                <asvg:svgBlip xmlns:asvg="http://schemas.microsoft.com/office/drawing/2016/SVG/main" r:embed="rId3"/>
+              </a:ext>
+            </a:extLst>
+          </a:blip>
+          <a:stretch>
+            <a:fillRect/>
+          </a:stretch>
+        </p:blipFill>
+        <p:spPr>
+          <a:xfrm>
+            <a:off x="2079894" y="579514"/>
+            <a:ext cx="8032211" cy="5698972"/>
+          </a:xfrm>
+          <a:prstGeom prst="rect">
+            <a:avLst/>
+          </a:prstGeom>
+        </p:spPr>
+      </p:pic>
+      <p:pic>
+        <p:nvPicPr>
+          <p:cNvPr id="3" name="Grafik 2">
+            <a:extLst>
+              <a:ext uri="{FF2B5EF4-FFF2-40B4-BE49-F238E27FC236}">
+                <a16:creationId xmlns:a16="http://schemas.microsoft.com/office/drawing/2014/main" id="{32CB711C-9CF7-436F-A7F3-67B6D98D5D74}"/>
+              </a:ext>
+            </a:extLst>
+          </p:cNvPr>
+          <p:cNvPicPr>
+            <a:picLocks noChangeAspect="1"/>
+          </p:cNvPicPr>
+          <p:nvPr/>
+        </p:nvPicPr>
+        <p:blipFill>
+          <a:blip r:embed="rId4">
+            <a:extLst>
+              <a:ext uri="{28A0092B-C50C-407E-A947-70E740481C1C}">
+                <a14:useLocalDpi xmlns:a14="http://schemas.microsoft.com/office/drawing/2010/main" val="0"/>
+              </a:ext>
+              <a:ext uri="{96DAC541-7B7A-43D3-8B79-37D633B846F1}">
+                <asvg:svgBlip xmlns:asvg="http://schemas.microsoft.com/office/drawing/2016/SVG/main" r:embed="rId5"/>
+              </a:ext>
+            </a:extLst>
+          </a:blip>
+          <a:stretch>
+            <a:fillRect/>
+          </a:stretch>
+        </p:blipFill>
+        <p:spPr>
+          <a:xfrm>
+            <a:off x="3774141" y="177794"/>
+            <a:ext cx="12192000" cy="4010223"/>
+          </a:xfrm>
+          <a:prstGeom prst="rect">
+            <a:avLst/>
+          </a:prstGeom>
+        </p:spPr>
+      </p:pic>
+      <p:sp>
+        <p:nvSpPr>
+          <p:cNvPr id="5" name="Ellipse 4">
+            <a:extLst>
+              <a:ext uri="{FF2B5EF4-FFF2-40B4-BE49-F238E27FC236}">
+                <a16:creationId xmlns:a16="http://schemas.microsoft.com/office/drawing/2014/main" id="{31409135-56A7-44C2-B178-55102836342F}"/>
+              </a:ext>
+            </a:extLst>
+          </p:cNvPr>
+          <p:cNvSpPr/>
+          <p:nvPr/>
+        </p:nvSpPr>
+        <p:spPr>
+          <a:xfrm>
+            <a:off x="8695143" y="100584"/>
+            <a:ext cx="3395472" cy="3584448"/>
+          </a:xfrm>
+          <a:prstGeom prst="ellipse">
+            <a:avLst/>
+          </a:prstGeom>
+          <a:noFill/>
+          <a:ln>
+            <a:solidFill>
+              <a:schemeClr val="tx1"/>
+            </a:solidFill>
+          </a:ln>
+        </p:spPr>
+        <p:style>
+          <a:lnRef idx="2">
+            <a:schemeClr val="accent1">
+              <a:shade val="50000"/>
+            </a:schemeClr>
+          </a:lnRef>
+          <a:fillRef idx="1">
+            <a:schemeClr val="accent1"/>
+          </a:fillRef>
+          <a:effectRef idx="0">
+            <a:schemeClr val="accent1"/>
+          </a:effectRef>
+          <a:fontRef idx="minor">
+            <a:schemeClr val="lt1"/>
+          </a:fontRef>
+        </p:style>
+        <p:txBody>
+          <a:bodyPr rtlCol="0" anchor="ctr"/>
+          <a:lstStyle/>
+          <a:p>
+            <a:pPr algn="ctr"/>
+            <a:endParaRPr lang="de-DE"/>
+          </a:p>
+        </p:txBody>
+      </p:sp>
+      <p:cxnSp>
+        <p:nvCxnSpPr>
+          <p:cNvPr id="7" name="Gerader Verbinder 6">
+            <a:extLst>
+              <a:ext uri="{FF2B5EF4-FFF2-40B4-BE49-F238E27FC236}">
+                <a16:creationId xmlns:a16="http://schemas.microsoft.com/office/drawing/2014/main" id="{0AC520DE-4B7A-47AC-A64D-7FE4BA900A47}"/>
+              </a:ext>
+            </a:extLst>
+          </p:cNvPr>
+          <p:cNvCxnSpPr>
+            <a:cxnSpLocks/>
+            <a:endCxn id="5" idx="1"/>
+          </p:cNvCxnSpPr>
+          <p:nvPr/>
+        </p:nvCxnSpPr>
+        <p:spPr>
+          <a:xfrm flipV="1">
+            <a:off x="6784848" y="625514"/>
+            <a:ext cx="2407550" cy="1889086"/>
+          </a:xfrm>
+          <a:prstGeom prst="line">
+            <a:avLst/>
+          </a:prstGeom>
+        </p:spPr>
+        <p:style>
+          <a:lnRef idx="2">
+            <a:schemeClr val="dk1"/>
+          </a:lnRef>
+          <a:fillRef idx="0">
+            <a:schemeClr val="dk1"/>
+          </a:fillRef>
+          <a:effectRef idx="1">
+            <a:schemeClr val="dk1"/>
+          </a:effectRef>
+          <a:fontRef idx="minor">
+            <a:schemeClr val="tx1"/>
+          </a:fontRef>
+        </p:style>
+      </p:cxnSp>
+      <p:cxnSp>
+        <p:nvCxnSpPr>
+          <p:cNvPr id="9" name="Gerader Verbinder 8">
+            <a:extLst>
+              <a:ext uri="{FF2B5EF4-FFF2-40B4-BE49-F238E27FC236}">
+                <a16:creationId xmlns:a16="http://schemas.microsoft.com/office/drawing/2014/main" id="{3364BF4F-627F-410E-BE13-FA238FF9C465}"/>
+              </a:ext>
+            </a:extLst>
+          </p:cNvPr>
+          <p:cNvCxnSpPr>
+            <a:cxnSpLocks/>
+            <a:endCxn id="5" idx="4"/>
+          </p:cNvCxnSpPr>
+          <p:nvPr/>
+        </p:nvCxnSpPr>
+        <p:spPr>
+          <a:xfrm flipV="1">
+            <a:off x="7196328" y="3685032"/>
+            <a:ext cx="3196551" cy="228600"/>
+          </a:xfrm>
+          <a:prstGeom prst="line">
+            <a:avLst/>
+          </a:prstGeom>
+        </p:spPr>
+        <p:style>
+          <a:lnRef idx="2">
+            <a:schemeClr val="dk1"/>
+          </a:lnRef>
+          <a:fillRef idx="0">
+            <a:schemeClr val="dk1"/>
+          </a:fillRef>
+          <a:effectRef idx="1">
+            <a:schemeClr val="dk1"/>
+          </a:effectRef>
+          <a:fontRef idx="minor">
+            <a:schemeClr val="tx1"/>
+          </a:fontRef>
+        </p:style>
+      </p:cxnSp>
+      <p:sp>
+        <p:nvSpPr>
+          <p:cNvPr id="15" name="Textfeld 14">
+            <a:extLst>
+              <a:ext uri="{FF2B5EF4-FFF2-40B4-BE49-F238E27FC236}">
+                <a16:creationId xmlns:a16="http://schemas.microsoft.com/office/drawing/2014/main" id="{9EBC0C39-7D72-43EE-B01D-E584F1149FE2}"/>
+              </a:ext>
+            </a:extLst>
+          </p:cNvPr>
+          <p:cNvSpPr txBox="1"/>
+          <p:nvPr/>
+        </p:nvSpPr>
+        <p:spPr>
+          <a:xfrm>
+            <a:off x="9750245" y="4134422"/>
+            <a:ext cx="3083859" cy="769441"/>
+          </a:xfrm>
+          <a:prstGeom prst="rect">
+            <a:avLst/>
+          </a:prstGeom>
+          <a:noFill/>
+        </p:spPr>
+        <p:txBody>
+          <a:bodyPr wrap="square" rtlCol="0">
+            <a:spAutoFit/>
+          </a:bodyPr>
+          <a:lstStyle/>
+          <a:p>
+            <a:r>
+              <a:rPr lang="de-DE" sz="1100" dirty="0">
+                <a:latin typeface="Verdana" panose="020B0604030504040204" pitchFamily="34" charset="0"/>
+                <a:ea typeface="Verdana" panose="020B0604030504040204" pitchFamily="34" charset="0"/>
+              </a:rPr>
+              <a:t>\</a:t>
+            </a:r>
+            <a:r>
+              <a:rPr lang="de-DE" sz="1100" dirty="0" err="1">
+                <a:latin typeface="Verdana" panose="020B0604030504040204" pitchFamily="34" charset="0"/>
+                <a:ea typeface="Verdana" panose="020B0604030504040204" pitchFamily="34" charset="0"/>
+              </a:rPr>
+              <a:t>begin</a:t>
+            </a:r>
+            <a:r>
+              <a:rPr lang="de-DE" sz="1100" dirty="0">
+                <a:latin typeface="Verdana" panose="020B0604030504040204" pitchFamily="34" charset="0"/>
+                <a:ea typeface="Verdana" panose="020B0604030504040204" pitchFamily="34" charset="0"/>
+              </a:rPr>
+              <a:t>{</a:t>
+            </a:r>
+            <a:r>
+              <a:rPr lang="de-DE" sz="1100" dirty="0" err="1">
+                <a:latin typeface="Verdana" panose="020B0604030504040204" pitchFamily="34" charset="0"/>
+                <a:ea typeface="Verdana" panose="020B0604030504040204" pitchFamily="34" charset="0"/>
+              </a:rPr>
+              <a:t>tikzpicture</a:t>
+            </a:r>
+            <a:r>
+              <a:rPr lang="de-DE" sz="1100" dirty="0">
+                <a:latin typeface="Verdana" panose="020B0604030504040204" pitchFamily="34" charset="0"/>
+                <a:ea typeface="Verdana" panose="020B0604030504040204" pitchFamily="34" charset="0"/>
+              </a:rPr>
+              <a:t>}</a:t>
+            </a:r>
+          </a:p>
+          <a:p>
+            <a:r>
+              <a:rPr lang="de-DE" sz="1100" dirty="0">
+                <a:latin typeface="Verdana" panose="020B0604030504040204" pitchFamily="34" charset="0"/>
+                <a:ea typeface="Verdana" panose="020B0604030504040204" pitchFamily="34" charset="0"/>
+              </a:rPr>
+              <a:t>      % Parent Code</a:t>
+            </a:r>
+          </a:p>
+          <a:p>
+            <a:r>
+              <a:rPr lang="de-DE" sz="1100" dirty="0">
+                <a:latin typeface="Verdana" panose="020B0604030504040204" pitchFamily="34" charset="0"/>
+                <a:ea typeface="Verdana" panose="020B0604030504040204" pitchFamily="34" charset="0"/>
+              </a:rPr>
+              <a:t>      \</a:t>
+            </a:r>
+            <a:r>
+              <a:rPr lang="de-DE" sz="1100" dirty="0" err="1">
+                <a:latin typeface="Verdana" panose="020B0604030504040204" pitchFamily="34" charset="0"/>
+                <a:ea typeface="Verdana" panose="020B0604030504040204" pitchFamily="34" charset="0"/>
+              </a:rPr>
+              <a:t>input</a:t>
+            </a:r>
+            <a:r>
+              <a:rPr lang="de-DE" sz="1100" dirty="0">
+                <a:latin typeface="Verdana" panose="020B0604030504040204" pitchFamily="34" charset="0"/>
+                <a:ea typeface="Verdana" panose="020B0604030504040204" pitchFamily="34" charset="0"/>
+              </a:rPr>
+              <a:t>{</a:t>
+            </a:r>
+            <a:r>
+              <a:rPr lang="de-DE" sz="1100" dirty="0" err="1">
+                <a:latin typeface="Verdana" panose="020B0604030504040204" pitchFamily="34" charset="0"/>
+                <a:ea typeface="Verdana" panose="020B0604030504040204" pitchFamily="34" charset="0"/>
+              </a:rPr>
+              <a:t>quadCopter.tex</a:t>
+            </a:r>
+            <a:r>
+              <a:rPr lang="de-DE" sz="1100" dirty="0">
+                <a:latin typeface="Verdana" panose="020B0604030504040204" pitchFamily="34" charset="0"/>
+                <a:ea typeface="Verdana" panose="020B0604030504040204" pitchFamily="34" charset="0"/>
+              </a:rPr>
+              <a:t>}</a:t>
+            </a:r>
+          </a:p>
+          <a:p>
+            <a:r>
+              <a:rPr lang="de-DE" sz="1100" dirty="0">
+                <a:latin typeface="Verdana" panose="020B0604030504040204" pitchFamily="34" charset="0"/>
+                <a:ea typeface="Verdana" panose="020B0604030504040204" pitchFamily="34" charset="0"/>
+              </a:rPr>
+              <a:t>\end{</a:t>
+            </a:r>
+            <a:r>
+              <a:rPr lang="de-DE" sz="1100" dirty="0" err="1">
+                <a:latin typeface="Verdana" panose="020B0604030504040204" pitchFamily="34" charset="0"/>
+                <a:ea typeface="Verdana" panose="020B0604030504040204" pitchFamily="34" charset="0"/>
+              </a:rPr>
+              <a:t>tikzpicture</a:t>
+            </a:r>
+            <a:r>
+              <a:rPr lang="de-DE" sz="1100" dirty="0">
+                <a:latin typeface="Verdana" panose="020B0604030504040204" pitchFamily="34" charset="0"/>
+                <a:ea typeface="Verdana" panose="020B0604030504040204" pitchFamily="34" charset="0"/>
+              </a:rPr>
+              <a:t>}</a:t>
+            </a:r>
+          </a:p>
+        </p:txBody>
+      </p:sp>
+      <p:sp>
+        <p:nvSpPr>
+          <p:cNvPr id="16" name="Geschweifte Klammer rechts 15">
+            <a:extLst>
+              <a:ext uri="{FF2B5EF4-FFF2-40B4-BE49-F238E27FC236}">
+                <a16:creationId xmlns:a16="http://schemas.microsoft.com/office/drawing/2014/main" id="{E74E6B7B-B22B-40D7-9B95-C81A1BA5ED54}"/>
+              </a:ext>
+            </a:extLst>
+          </p:cNvPr>
+          <p:cNvSpPr/>
+          <p:nvPr/>
+        </p:nvSpPr>
+        <p:spPr>
+          <a:xfrm rot="5400000">
+            <a:off x="10629064" y="3028132"/>
+            <a:ext cx="133834" cy="1938637"/>
+          </a:xfrm>
+          <a:prstGeom prst="rightBrace">
+            <a:avLst/>
+          </a:prstGeom>
+        </p:spPr>
+        <p:style>
+          <a:lnRef idx="2">
+            <a:schemeClr val="dk1"/>
+          </a:lnRef>
+          <a:fillRef idx="0">
+            <a:schemeClr val="dk1"/>
+          </a:fillRef>
+          <a:effectRef idx="1">
+            <a:schemeClr val="dk1"/>
+          </a:effectRef>
+          <a:fontRef idx="minor">
+            <a:schemeClr val="tx1"/>
+          </a:fontRef>
+        </p:style>
+        <p:txBody>
+          <a:bodyPr rtlCol="0" anchor="ctr"/>
+          <a:lstStyle/>
+          <a:p>
+            <a:pPr algn="ctr"/>
+            <a:endParaRPr lang="de-DE"/>
+          </a:p>
+        </p:txBody>
+      </p:sp>
+    </p:spTree>
+    <p:extLst>
+      <p:ext uri="{BB962C8B-B14F-4D97-AF65-F5344CB8AC3E}">
+        <p14:creationId xmlns:p14="http://schemas.microsoft.com/office/powerpoint/2010/main" val="3434000416"/>
       </p:ext>
     </p:extLst>
   </p:cSld>

</xml_diff>